<commit_message>
Till use State form Validation
</commit_message>
<xml_diff>
--- a/slides/ReactJs Training.pptx
+++ b/slides/ReactJs Training.pptx
@@ -317,7 +317,7 @@
           <a:p>
             <a:fld id="{3657AA7F-BE72-4467-897E-7A302F46504F}" type="datetimeFigureOut">
               <a:rPr lang="en-US" smtClean="0"/>
-              <a:t>5/6/2023</a:t>
+              <a:t>5/7/2023</a:t>
             </a:fld>
             <a:endParaRPr lang="en-US"/>
           </a:p>
@@ -516,7 +516,7 @@
           <a:p>
             <a:fld id="{3657AA7F-BE72-4467-897E-7A302F46504F}" type="datetimeFigureOut">
               <a:rPr lang="en-US" smtClean="0"/>
-              <a:t>5/6/2023</a:t>
+              <a:t>5/7/2023</a:t>
             </a:fld>
             <a:endParaRPr lang="en-US"/>
           </a:p>
@@ -725,7 +725,7 @@
           <a:p>
             <a:fld id="{3657AA7F-BE72-4467-897E-7A302F46504F}" type="datetimeFigureOut">
               <a:rPr lang="en-US" smtClean="0"/>
-              <a:t>5/6/2023</a:t>
+              <a:t>5/7/2023</a:t>
             </a:fld>
             <a:endParaRPr lang="en-US"/>
           </a:p>
@@ -924,7 +924,7 @@
           <a:p>
             <a:fld id="{3657AA7F-BE72-4467-897E-7A302F46504F}" type="datetimeFigureOut">
               <a:rPr lang="en-US" smtClean="0"/>
-              <a:t>5/6/2023</a:t>
+              <a:t>5/7/2023</a:t>
             </a:fld>
             <a:endParaRPr lang="en-US"/>
           </a:p>
@@ -1202,7 +1202,7 @@
           <a:p>
             <a:fld id="{3657AA7F-BE72-4467-897E-7A302F46504F}" type="datetimeFigureOut">
               <a:rPr lang="en-US" smtClean="0"/>
-              <a:t>5/6/2023</a:t>
+              <a:t>5/7/2023</a:t>
             </a:fld>
             <a:endParaRPr lang="en-US"/>
           </a:p>
@@ -1469,7 +1469,7 @@
           <a:p>
             <a:fld id="{3657AA7F-BE72-4467-897E-7A302F46504F}" type="datetimeFigureOut">
               <a:rPr lang="en-US" smtClean="0"/>
-              <a:t>5/6/2023</a:t>
+              <a:t>5/7/2023</a:t>
             </a:fld>
             <a:endParaRPr lang="en-US"/>
           </a:p>
@@ -1883,7 +1883,7 @@
           <a:p>
             <a:fld id="{3657AA7F-BE72-4467-897E-7A302F46504F}" type="datetimeFigureOut">
               <a:rPr lang="en-US" smtClean="0"/>
-              <a:t>5/6/2023</a:t>
+              <a:t>5/7/2023</a:t>
             </a:fld>
             <a:endParaRPr lang="en-US"/>
           </a:p>
@@ -2024,7 +2024,7 @@
           <a:p>
             <a:fld id="{3657AA7F-BE72-4467-897E-7A302F46504F}" type="datetimeFigureOut">
               <a:rPr lang="en-US" smtClean="0"/>
-              <a:t>5/6/2023</a:t>
+              <a:t>5/7/2023</a:t>
             </a:fld>
             <a:endParaRPr lang="en-US"/>
           </a:p>
@@ -2137,7 +2137,7 @@
           <a:p>
             <a:fld id="{3657AA7F-BE72-4467-897E-7A302F46504F}" type="datetimeFigureOut">
               <a:rPr lang="en-US" smtClean="0"/>
-              <a:t>5/6/2023</a:t>
+              <a:t>5/7/2023</a:t>
             </a:fld>
             <a:endParaRPr lang="en-US"/>
           </a:p>
@@ -2453,7 +2453,7 @@
           <a:p>
             <a:fld id="{3657AA7F-BE72-4467-897E-7A302F46504F}" type="datetimeFigureOut">
               <a:rPr lang="en-US" smtClean="0"/>
-              <a:t>5/6/2023</a:t>
+              <a:t>5/7/2023</a:t>
             </a:fld>
             <a:endParaRPr lang="en-US"/>
           </a:p>
@@ -2747,7 +2747,7 @@
           <a:p>
             <a:fld id="{3657AA7F-BE72-4467-897E-7A302F46504F}" type="datetimeFigureOut">
               <a:rPr lang="en-US" smtClean="0"/>
-              <a:t>5/6/2023</a:t>
+              <a:t>5/7/2023</a:t>
             </a:fld>
             <a:endParaRPr lang="en-US"/>
           </a:p>
@@ -3103,7 +3103,7 @@
             <a:fld id="{3657AA7F-BE72-4467-897E-7A302F46504F}" type="datetimeFigureOut">
               <a:rPr lang="en-US" smtClean="0"/>
               <a:pPr/>
-              <a:t>5/6/2023</a:t>
+              <a:t>5/7/2023</a:t>
             </a:fld>
             <a:endParaRPr lang="en-US" dirty="0"/>
           </a:p>
@@ -8598,7 +8598,15 @@
             </a:pPr>
             <a:r>
               <a:rPr lang="en-US" dirty="0"/>
-              <a:t>Can be pass as props</a:t>
+              <a:t>Can be pass as props =&gt; State Lifting (State </a:t>
+            </a:r>
+            <a:r>
+              <a:rPr lang="en-US" dirty="0" err="1"/>
+              <a:t>Uplifiting</a:t>
+            </a:r>
+            <a:r>
+              <a:rPr lang="en-US" dirty="0"/>
+              <a:t>)</a:t>
             </a:r>
           </a:p>
           <a:p>

</xml_diff>

<commit_message>
Till redux and count example
</commit_message>
<xml_diff>
--- a/slides/ReactJs Training.pptx
+++ b/slides/ReactJs Training.pptx
@@ -317,7 +317,7 @@
           <a:p>
             <a:fld id="{3657AA7F-BE72-4467-897E-7A302F46504F}" type="datetimeFigureOut">
               <a:rPr lang="en-US" smtClean="0"/>
-              <a:t>5/13/2023</a:t>
+              <a:t>5/19/2023</a:t>
             </a:fld>
             <a:endParaRPr lang="en-US"/>
           </a:p>
@@ -516,7 +516,7 @@
           <a:p>
             <a:fld id="{3657AA7F-BE72-4467-897E-7A302F46504F}" type="datetimeFigureOut">
               <a:rPr lang="en-US" smtClean="0"/>
-              <a:t>5/13/2023</a:t>
+              <a:t>5/19/2023</a:t>
             </a:fld>
             <a:endParaRPr lang="en-US"/>
           </a:p>
@@ -725,7 +725,7 @@
           <a:p>
             <a:fld id="{3657AA7F-BE72-4467-897E-7A302F46504F}" type="datetimeFigureOut">
               <a:rPr lang="en-US" smtClean="0"/>
-              <a:t>5/13/2023</a:t>
+              <a:t>5/19/2023</a:t>
             </a:fld>
             <a:endParaRPr lang="en-US"/>
           </a:p>
@@ -924,7 +924,7 @@
           <a:p>
             <a:fld id="{3657AA7F-BE72-4467-897E-7A302F46504F}" type="datetimeFigureOut">
               <a:rPr lang="en-US" smtClean="0"/>
-              <a:t>5/13/2023</a:t>
+              <a:t>5/19/2023</a:t>
             </a:fld>
             <a:endParaRPr lang="en-US"/>
           </a:p>
@@ -1202,7 +1202,7 @@
           <a:p>
             <a:fld id="{3657AA7F-BE72-4467-897E-7A302F46504F}" type="datetimeFigureOut">
               <a:rPr lang="en-US" smtClean="0"/>
-              <a:t>5/13/2023</a:t>
+              <a:t>5/19/2023</a:t>
             </a:fld>
             <a:endParaRPr lang="en-US"/>
           </a:p>
@@ -1469,7 +1469,7 @@
           <a:p>
             <a:fld id="{3657AA7F-BE72-4467-897E-7A302F46504F}" type="datetimeFigureOut">
               <a:rPr lang="en-US" smtClean="0"/>
-              <a:t>5/13/2023</a:t>
+              <a:t>5/19/2023</a:t>
             </a:fld>
             <a:endParaRPr lang="en-US"/>
           </a:p>
@@ -1883,7 +1883,7 @@
           <a:p>
             <a:fld id="{3657AA7F-BE72-4467-897E-7A302F46504F}" type="datetimeFigureOut">
               <a:rPr lang="en-US" smtClean="0"/>
-              <a:t>5/13/2023</a:t>
+              <a:t>5/19/2023</a:t>
             </a:fld>
             <a:endParaRPr lang="en-US"/>
           </a:p>
@@ -2024,7 +2024,7 @@
           <a:p>
             <a:fld id="{3657AA7F-BE72-4467-897E-7A302F46504F}" type="datetimeFigureOut">
               <a:rPr lang="en-US" smtClean="0"/>
-              <a:t>5/13/2023</a:t>
+              <a:t>5/19/2023</a:t>
             </a:fld>
             <a:endParaRPr lang="en-US"/>
           </a:p>
@@ -2137,7 +2137,7 @@
           <a:p>
             <a:fld id="{3657AA7F-BE72-4467-897E-7A302F46504F}" type="datetimeFigureOut">
               <a:rPr lang="en-US" smtClean="0"/>
-              <a:t>5/13/2023</a:t>
+              <a:t>5/19/2023</a:t>
             </a:fld>
             <a:endParaRPr lang="en-US"/>
           </a:p>
@@ -2453,7 +2453,7 @@
           <a:p>
             <a:fld id="{3657AA7F-BE72-4467-897E-7A302F46504F}" type="datetimeFigureOut">
               <a:rPr lang="en-US" smtClean="0"/>
-              <a:t>5/13/2023</a:t>
+              <a:t>5/19/2023</a:t>
             </a:fld>
             <a:endParaRPr lang="en-US"/>
           </a:p>
@@ -2747,7 +2747,7 @@
           <a:p>
             <a:fld id="{3657AA7F-BE72-4467-897E-7A302F46504F}" type="datetimeFigureOut">
               <a:rPr lang="en-US" smtClean="0"/>
-              <a:t>5/13/2023</a:t>
+              <a:t>5/19/2023</a:t>
             </a:fld>
             <a:endParaRPr lang="en-US"/>
           </a:p>
@@ -3103,7 +3103,7 @@
             <a:fld id="{3657AA7F-BE72-4467-897E-7A302F46504F}" type="datetimeFigureOut">
               <a:rPr lang="en-US" smtClean="0"/>
               <a:pPr/>
-              <a:t>5/13/2023</a:t>
+              <a:t>5/19/2023</a:t>
             </a:fld>
             <a:endParaRPr lang="en-US" dirty="0"/>
           </a:p>
@@ -13464,7 +13464,7 @@
         </p:nvSpPr>
         <p:spPr>
           <a:xfrm>
-            <a:off x="172329" y="346076"/>
+            <a:off x="172329" y="333197"/>
             <a:ext cx="7317348" cy="879475"/>
           </a:xfrm>
         </p:spPr>

</xml_diff>